<commit_message>
content: Add Lecture Slides to Sequences (Part 2)
</commit_message>
<xml_diff>
--- a/source/sequences/_static/stacks/stacks_and_queues.pptx
+++ b/source/sequences/_static/stacks/stacks_and_queues.pptx
@@ -215,7 +215,7 @@
           <a:p>
             <a:fld id="{84F29782-C61A-CD4C-9376-B0A272778357}" type="datetimeFigureOut">
               <a:rPr lang="en-NO" smtClean="0"/>
-              <a:t>12/09/2022</a:t>
+              <a:t>10/09/2023</a:t>
             </a:fld>
             <a:endParaRPr lang="en-NO"/>
           </a:p>
@@ -4301,7 +4301,7 @@
           <a:p>
             <a:r>
               <a:rPr lang="en-NO" dirty="0"/>
-              <a:t>Week 4 / Lecture 3</a:t>
+              <a:t>Sequences / Lecture 6</a:t>
             </a:r>
           </a:p>
         </p:txBody>

</xml_diff>